<commit_message>
add analyses with XXY null and figS2 folder
</commit_message>
<xml_diff>
--- a/figures/mammals/fig2/fig2.pptx
+++ b/figures/mammals/fig2/fig2.pptx
@@ -104,6 +104,11 @@
       </a:defRPr>
     </a:lvl9pPr>
   </p:defaultTextStyle>
+  <p:extLst>
+    <p:ext uri="{EFAFB233-063F-42B5-8137-9DF3F51BA10A}">
+      <p15:sldGuideLst xmlns:p15="http://schemas.microsoft.com/office/powerpoint/2012/main"/>
+    </p:ext>
+  </p:extLst>
 </p:presentation>
 </file>
 
@@ -238,7 +243,7 @@
           <a:p>
             <a:fld id="{2EEB1145-C390-1141-AF76-CDFFE0FED82B}" type="datetimeFigureOut">
               <a:rPr lang="en-US" smtClean="0"/>
-              <a:t>4/21/24</a:t>
+              <a:t>5/3/24</a:t>
             </a:fld>
             <a:endParaRPr lang="en-US"/>
           </a:p>
@@ -408,7 +413,7 @@
           <a:p>
             <a:fld id="{2EEB1145-C390-1141-AF76-CDFFE0FED82B}" type="datetimeFigureOut">
               <a:rPr lang="en-US" smtClean="0"/>
-              <a:t>4/21/24</a:t>
+              <a:t>5/3/24</a:t>
             </a:fld>
             <a:endParaRPr lang="en-US"/>
           </a:p>
@@ -588,7 +593,7 @@
           <a:p>
             <a:fld id="{2EEB1145-C390-1141-AF76-CDFFE0FED82B}" type="datetimeFigureOut">
               <a:rPr lang="en-US" smtClean="0"/>
-              <a:t>4/21/24</a:t>
+              <a:t>5/3/24</a:t>
             </a:fld>
             <a:endParaRPr lang="en-US"/>
           </a:p>
@@ -758,7 +763,7 @@
           <a:p>
             <a:fld id="{2EEB1145-C390-1141-AF76-CDFFE0FED82B}" type="datetimeFigureOut">
               <a:rPr lang="en-US" smtClean="0"/>
-              <a:t>4/21/24</a:t>
+              <a:t>5/3/24</a:t>
             </a:fld>
             <a:endParaRPr lang="en-US"/>
           </a:p>
@@ -1004,7 +1009,7 @@
           <a:p>
             <a:fld id="{2EEB1145-C390-1141-AF76-CDFFE0FED82B}" type="datetimeFigureOut">
               <a:rPr lang="en-US" smtClean="0"/>
-              <a:t>4/21/24</a:t>
+              <a:t>5/3/24</a:t>
             </a:fld>
             <a:endParaRPr lang="en-US"/>
           </a:p>
@@ -1236,7 +1241,7 @@
           <a:p>
             <a:fld id="{2EEB1145-C390-1141-AF76-CDFFE0FED82B}" type="datetimeFigureOut">
               <a:rPr lang="en-US" smtClean="0"/>
-              <a:t>4/21/24</a:t>
+              <a:t>5/3/24</a:t>
             </a:fld>
             <a:endParaRPr lang="en-US"/>
           </a:p>
@@ -1603,7 +1608,7 @@
           <a:p>
             <a:fld id="{2EEB1145-C390-1141-AF76-CDFFE0FED82B}" type="datetimeFigureOut">
               <a:rPr lang="en-US" smtClean="0"/>
-              <a:t>4/21/24</a:t>
+              <a:t>5/3/24</a:t>
             </a:fld>
             <a:endParaRPr lang="en-US"/>
           </a:p>
@@ -1721,7 +1726,7 @@
           <a:p>
             <a:fld id="{2EEB1145-C390-1141-AF76-CDFFE0FED82B}" type="datetimeFigureOut">
               <a:rPr lang="en-US" smtClean="0"/>
-              <a:t>4/21/24</a:t>
+              <a:t>5/3/24</a:t>
             </a:fld>
             <a:endParaRPr lang="en-US"/>
           </a:p>
@@ -1816,7 +1821,7 @@
           <a:p>
             <a:fld id="{2EEB1145-C390-1141-AF76-CDFFE0FED82B}" type="datetimeFigureOut">
               <a:rPr lang="en-US" smtClean="0"/>
-              <a:t>4/21/24</a:t>
+              <a:t>5/3/24</a:t>
             </a:fld>
             <a:endParaRPr lang="en-US"/>
           </a:p>
@@ -2093,7 +2098,7 @@
           <a:p>
             <a:fld id="{2EEB1145-C390-1141-AF76-CDFFE0FED82B}" type="datetimeFigureOut">
               <a:rPr lang="en-US" smtClean="0"/>
-              <a:t>4/21/24</a:t>
+              <a:t>5/3/24</a:t>
             </a:fld>
             <a:endParaRPr lang="en-US"/>
           </a:p>
@@ -2350,7 +2355,7 @@
           <a:p>
             <a:fld id="{2EEB1145-C390-1141-AF76-CDFFE0FED82B}" type="datetimeFigureOut">
               <a:rPr lang="en-US" smtClean="0"/>
-              <a:t>4/21/24</a:t>
+              <a:t>5/3/24</a:t>
             </a:fld>
             <a:endParaRPr lang="en-US"/>
           </a:p>
@@ -2563,7 +2568,7 @@
           <a:p>
             <a:fld id="{2EEB1145-C390-1141-AF76-CDFFE0FED82B}" type="datetimeFigureOut">
               <a:rPr lang="en-US" smtClean="0"/>
-              <a:t>4/21/24</a:t>
+              <a:t>5/3/24</a:t>
             </a:fld>
             <a:endParaRPr lang="en-US"/>
           </a:p>
@@ -3933,6 +3938,41 @@
             <a:r>
               <a:rPr lang="en-US" sz="1400" dirty="0"/>
               <a:t>b)</a:t>
+            </a:r>
+          </a:p>
+        </p:txBody>
+      </p:sp>
+      <p:sp>
+        <p:nvSpPr>
+          <p:cNvPr id="2" name="TextBox 1">
+            <a:extLst>
+              <a:ext uri="{FF2B5EF4-FFF2-40B4-BE49-F238E27FC236}">
+                <a16:creationId xmlns:a16="http://schemas.microsoft.com/office/drawing/2014/main" id="{A9E72959-4F1E-3C09-CE9B-339DB6A76769}"/>
+              </a:ext>
+            </a:extLst>
+          </p:cNvPr>
+          <p:cNvSpPr txBox="1"/>
+          <p:nvPr/>
+        </p:nvSpPr>
+        <p:spPr>
+          <a:xfrm flipH="1">
+            <a:off x="2741758" y="3902354"/>
+            <a:ext cx="219238" cy="268984"/>
+          </a:xfrm>
+          <a:prstGeom prst="rect">
+            <a:avLst/>
+          </a:prstGeom>
+          <a:noFill/>
+        </p:spPr>
+        <p:txBody>
+          <a:bodyPr wrap="square" rtlCol="0">
+            <a:spAutoFit/>
+          </a:bodyPr>
+          <a:lstStyle/>
+          <a:p>
+            <a:r>
+              <a:rPr lang="en-US" sz="1150" dirty="0"/>
+              <a:t>ρ</a:t>
             </a:r>
           </a:p>
         </p:txBody>

</xml_diff>